<commit_message>
Change color to Blue
</commit_message>
<xml_diff>
--- a/software/sikhi2max/themes/only_translation.pptx
+++ b/software/sikhi2max/themes/only_translation.pptx
@@ -235,7 +235,7 @@
               <a:pPr>
                 <a:defRPr/>
               </a:pPr>
-              <a:t>6/12/2014</a:t>
+              <a:t>6/15/2014</a:t>
             </a:fld>
             <a:endParaRPr lang="en-GB"/>
           </a:p>
@@ -574,16 +574,9 @@
   <p:cSld>
     <p:bg>
       <p:bgPr>
-        <a:blipFill dpi="0" rotWithShape="0">
-          <a:blip r:embed="rId3">
-            <a:alphaModFix amt="8000"/>
-            <a:lum/>
-          </a:blip>
-          <a:srcRect/>
-          <a:stretch>
-            <a:fillRect/>
-          </a:stretch>
-        </a:blipFill>
+        <a:solidFill>
+          <a:srgbClr val="000099"/>
+        </a:solidFill>
         <a:effectLst/>
       </p:bgPr>
     </p:bg>
@@ -1317,9 +1310,9 @@
               <a:defRPr/>
             </a:pPr>
             <a:r>
-              <a:rPr lang="en-GB" sz="3400" dirty="0">
+              <a:rPr lang="en-GB" dirty="0">
                 <a:solidFill>
-                  <a:srgbClr val="0066FF"/>
+                  <a:schemeClr val="bg1"/>
                 </a:solidFill>
                 <a:effectLst>
                   <a:outerShdw blurRad="38100" dist="38100" dir="2700000" algn="tl">

</xml_diff>